<commit_message>
zonnecollector: met aan/uit regeling
</commit_message>
<xml_diff>
--- a/model zonnecollector/achtergrond/Solar collector.pptx
+++ b/model zonnecollector/achtergrond/Solar collector.pptx
@@ -20,7 +20,8 @@
     <p:sldId id="267" r:id="rId17"/>
     <p:sldId id="268" r:id="rId18"/>
     <p:sldId id="272" r:id="rId19"/>
-    <p:sldId id="271" r:id="rId20"/>
+    <p:sldId id="273" r:id="rId20"/>
+    <p:sldId id="271" r:id="rId21"/>
   </p:sldIdLst>
   <p:sldSz cx="12192000" cy="6858000"/>
   <p:notesSz cx="6858000" cy="9144000"/>
@@ -893,7 +894,7 @@
           <a:p>
             <a:fld id="{093676F6-08B4-4D43-8044-4A86E6E6818F}" type="datetimeFigureOut">
               <a:rPr lang="nl-BE" smtClean="0"/>
-              <a:t>3/06/2020</a:t>
+              <a:t>8/06/2020</a:t>
             </a:fld>
             <a:endParaRPr lang="nl-BE"/>
           </a:p>
@@ -1093,7 +1094,7 @@
           <a:p>
             <a:fld id="{093676F6-08B4-4D43-8044-4A86E6E6818F}" type="datetimeFigureOut">
               <a:rPr lang="nl-BE" smtClean="0"/>
-              <a:t>3/06/2020</a:t>
+              <a:t>8/06/2020</a:t>
             </a:fld>
             <a:endParaRPr lang="nl-BE"/>
           </a:p>
@@ -1303,7 +1304,7 @@
           <a:p>
             <a:fld id="{093676F6-08B4-4D43-8044-4A86E6E6818F}" type="datetimeFigureOut">
               <a:rPr lang="nl-BE" smtClean="0"/>
-              <a:t>3/06/2020</a:t>
+              <a:t>8/06/2020</a:t>
             </a:fld>
             <a:endParaRPr lang="nl-BE"/>
           </a:p>
@@ -1503,7 +1504,7 @@
           <a:p>
             <a:fld id="{093676F6-08B4-4D43-8044-4A86E6E6818F}" type="datetimeFigureOut">
               <a:rPr lang="nl-BE" smtClean="0"/>
-              <a:t>3/06/2020</a:t>
+              <a:t>8/06/2020</a:t>
             </a:fld>
             <a:endParaRPr lang="nl-BE"/>
           </a:p>
@@ -1779,7 +1780,7 @@
           <a:p>
             <a:fld id="{093676F6-08B4-4D43-8044-4A86E6E6818F}" type="datetimeFigureOut">
               <a:rPr lang="nl-BE" smtClean="0"/>
-              <a:t>3/06/2020</a:t>
+              <a:t>8/06/2020</a:t>
             </a:fld>
             <a:endParaRPr lang="nl-BE"/>
           </a:p>
@@ -2047,7 +2048,7 @@
           <a:p>
             <a:fld id="{093676F6-08B4-4D43-8044-4A86E6E6818F}" type="datetimeFigureOut">
               <a:rPr lang="nl-BE" smtClean="0"/>
-              <a:t>3/06/2020</a:t>
+              <a:t>8/06/2020</a:t>
             </a:fld>
             <a:endParaRPr lang="nl-BE"/>
           </a:p>
@@ -2462,7 +2463,7 @@
           <a:p>
             <a:fld id="{093676F6-08B4-4D43-8044-4A86E6E6818F}" type="datetimeFigureOut">
               <a:rPr lang="nl-BE" smtClean="0"/>
-              <a:t>3/06/2020</a:t>
+              <a:t>8/06/2020</a:t>
             </a:fld>
             <a:endParaRPr lang="nl-BE"/>
           </a:p>
@@ -2604,7 +2605,7 @@
           <a:p>
             <a:fld id="{093676F6-08B4-4D43-8044-4A86E6E6818F}" type="datetimeFigureOut">
               <a:rPr lang="nl-BE" smtClean="0"/>
-              <a:t>3/06/2020</a:t>
+              <a:t>8/06/2020</a:t>
             </a:fld>
             <a:endParaRPr lang="nl-BE"/>
           </a:p>
@@ -2717,7 +2718,7 @@
           <a:p>
             <a:fld id="{093676F6-08B4-4D43-8044-4A86E6E6818F}" type="datetimeFigureOut">
               <a:rPr lang="nl-BE" smtClean="0"/>
-              <a:t>3/06/2020</a:t>
+              <a:t>8/06/2020</a:t>
             </a:fld>
             <a:endParaRPr lang="nl-BE"/>
           </a:p>
@@ -3030,7 +3031,7 @@
           <a:p>
             <a:fld id="{093676F6-08B4-4D43-8044-4A86E6E6818F}" type="datetimeFigureOut">
               <a:rPr lang="nl-BE" smtClean="0"/>
-              <a:t>3/06/2020</a:t>
+              <a:t>8/06/2020</a:t>
             </a:fld>
             <a:endParaRPr lang="nl-BE"/>
           </a:p>
@@ -3319,7 +3320,7 @@
           <a:p>
             <a:fld id="{093676F6-08B4-4D43-8044-4A86E6E6818F}" type="datetimeFigureOut">
               <a:rPr lang="nl-BE" smtClean="0"/>
-              <a:t>3/06/2020</a:t>
+              <a:t>8/06/2020</a:t>
             </a:fld>
             <a:endParaRPr lang="nl-BE"/>
           </a:p>
@@ -3562,7 +3563,7 @@
           <a:p>
             <a:fld id="{093676F6-08B4-4D43-8044-4A86E6E6818F}" type="datetimeFigureOut">
               <a:rPr lang="nl-BE" smtClean="0"/>
-              <a:t>3/06/2020</a:t>
+              <a:t>8/06/2020</a:t>
             </a:fld>
             <a:endParaRPr lang="nl-BE"/>
           </a:p>
@@ -5966,6 +5967,185 @@
 </file>
 
 <file path=ppt/slides/slide16.xml><?xml version="1.0" encoding="utf-8"?>
+<p:sld xmlns:a="http://schemas.openxmlformats.org/drawingml/2006/main" xmlns:r="http://schemas.openxmlformats.org/officeDocument/2006/relationships" xmlns:p="http://schemas.openxmlformats.org/presentationml/2006/main">
+  <p:cSld>
+    <p:spTree>
+      <p:nvGrpSpPr>
+        <p:cNvPr id="1" name=""/>
+        <p:cNvGrpSpPr/>
+        <p:nvPr/>
+      </p:nvGrpSpPr>
+      <p:grpSpPr>
+        <a:xfrm>
+          <a:off x="0" y="0"/>
+          <a:ext cx="0" cy="0"/>
+          <a:chOff x="0" y="0"/>
+          <a:chExt cx="0" cy="0"/>
+        </a:xfrm>
+      </p:grpSpPr>
+      <p:sp>
+        <p:nvSpPr>
+          <p:cNvPr id="2" name="Titel 1">
+            <a:extLst>
+              <a:ext uri="{FF2B5EF4-FFF2-40B4-BE49-F238E27FC236}">
+                <a16:creationId xmlns:a16="http://schemas.microsoft.com/office/drawing/2014/main" id="{0FB152EC-7524-422B-83AA-B36AD364E0C6}"/>
+              </a:ext>
+            </a:extLst>
+          </p:cNvPr>
+          <p:cNvSpPr>
+            <a:spLocks noGrp="1"/>
+          </p:cNvSpPr>
+          <p:nvPr>
+            <p:ph type="title"/>
+          </p:nvPr>
+        </p:nvSpPr>
+        <p:spPr/>
+        <p:txBody>
+          <a:bodyPr/>
+          <a:lstStyle/>
+          <a:p>
+            <a:endParaRPr lang="nl-BE" dirty="0"/>
+          </a:p>
+        </p:txBody>
+      </p:sp>
+      <p:sp>
+        <p:nvSpPr>
+          <p:cNvPr id="3" name="Tijdelijke aanduiding voor inhoud 2">
+            <a:extLst>
+              <a:ext uri="{FF2B5EF4-FFF2-40B4-BE49-F238E27FC236}">
+                <a16:creationId xmlns:a16="http://schemas.microsoft.com/office/drawing/2014/main" id="{2FEC862C-5520-4ADA-8815-6A52DECE288B}"/>
+              </a:ext>
+            </a:extLst>
+          </p:cNvPr>
+          <p:cNvSpPr>
+            <a:spLocks noGrp="1"/>
+          </p:cNvSpPr>
+          <p:nvPr>
+            <p:ph idx="1"/>
+          </p:nvPr>
+        </p:nvSpPr>
+        <p:spPr/>
+        <p:txBody>
+          <a:bodyPr/>
+          <a:lstStyle/>
+          <a:p>
+            <a:r>
+              <a:rPr lang="nl-BE" dirty="0" err="1"/>
+              <a:t>Better</a:t>
+            </a:r>
+            <a:r>
+              <a:rPr lang="nl-BE" dirty="0"/>
+              <a:t> </a:t>
+            </a:r>
+            <a:r>
+              <a:rPr lang="nl-BE" dirty="0" err="1"/>
+              <a:t>to</a:t>
+            </a:r>
+            <a:r>
+              <a:rPr lang="nl-BE" dirty="0"/>
+              <a:t> </a:t>
+            </a:r>
+            <a:r>
+              <a:rPr lang="nl-BE" dirty="0" err="1"/>
+              <a:t>use</a:t>
+            </a:r>
+            <a:r>
+              <a:rPr lang="nl-BE" dirty="0"/>
+              <a:t> model </a:t>
+            </a:r>
+            <a:r>
+              <a:rPr lang="nl-BE" dirty="0" err="1"/>
+              <a:t>with</a:t>
+            </a:r>
+            <a:r>
+              <a:rPr lang="nl-BE" dirty="0"/>
+              <a:t> </a:t>
+            </a:r>
+            <a:r>
+              <a:rPr lang="nl-BE" dirty="0" err="1"/>
+              <a:t>capacitance</a:t>
+            </a:r>
+            <a:r>
+              <a:rPr lang="nl-BE" dirty="0"/>
+              <a:t>, </a:t>
+            </a:r>
+            <a:r>
+              <a:rPr lang="nl-BE" dirty="0" err="1"/>
+              <a:t>for</a:t>
+            </a:r>
+            <a:r>
+              <a:rPr lang="nl-BE" dirty="0"/>
+              <a:t> control, </a:t>
+            </a:r>
+            <a:r>
+              <a:rPr lang="nl-BE" dirty="0" err="1"/>
+              <a:t>cf</a:t>
+            </a:r>
+            <a:r>
+              <a:rPr lang="nl-BE" dirty="0"/>
+              <a:t> </a:t>
+            </a:r>
+            <a:r>
+              <a:rPr lang="nl-BE" dirty="0" err="1"/>
+              <a:t>if</a:t>
+            </a:r>
+            <a:r>
+              <a:rPr lang="nl-BE" dirty="0"/>
+              <a:t> no </a:t>
+            </a:r>
+            <a:r>
+              <a:rPr lang="nl-BE" dirty="0" err="1"/>
+              <a:t>capacitance</a:t>
+            </a:r>
+            <a:r>
+              <a:rPr lang="nl-BE" dirty="0"/>
+              <a:t> </a:t>
+            </a:r>
+            <a:r>
+              <a:rPr lang="nl-BE" dirty="0" err="1"/>
+              <a:t>Tout</a:t>
+            </a:r>
+            <a:r>
+              <a:rPr lang="nl-BE" dirty="0"/>
+              <a:t> has no </a:t>
+            </a:r>
+            <a:r>
+              <a:rPr lang="nl-BE" dirty="0" err="1"/>
+              <a:t>meaning</a:t>
+            </a:r>
+            <a:r>
+              <a:rPr lang="nl-BE"/>
+              <a:t> if</a:t>
+            </a:r>
+            <a:r>
+              <a:rPr lang="nl-BE" dirty="0"/>
+              <a:t> flow=0 (no </a:t>
+            </a:r>
+            <a:r>
+              <a:rPr lang="nl-BE" dirty="0" err="1"/>
+              <a:t>increase</a:t>
+            </a:r>
+            <a:r>
+              <a:rPr lang="nl-BE" dirty="0"/>
+              <a:t> of collector temp)</a:t>
+            </a:r>
+          </a:p>
+        </p:txBody>
+      </p:sp>
+    </p:spTree>
+    <p:extLst>
+      <p:ext uri="{BB962C8B-B14F-4D97-AF65-F5344CB8AC3E}">
+        <p14:creationId xmlns:p14="http://schemas.microsoft.com/office/powerpoint/2010/main" val="3082891033"/>
+      </p:ext>
+    </p:extLst>
+  </p:cSld>
+  <p:clrMapOvr>
+    <a:masterClrMapping/>
+  </p:clrMapOvr>
+</p:sld>
+</file>
+
+<file path=ppt/slides/slide17.xml><?xml version="1.0" encoding="utf-8"?>
 <p:sld xmlns:a="http://schemas.openxmlformats.org/drawingml/2006/main" xmlns:r="http://schemas.openxmlformats.org/officeDocument/2006/relationships" xmlns:p="http://schemas.openxmlformats.org/presentationml/2006/main">
   <p:cSld>
     <p:spTree>
@@ -10299,6 +10479,21 @@
 </file>
 
 <file path=customXml/item1.xml><?xml version="1.0" encoding="utf-8"?>
+<p:properties xmlns:p="http://schemas.microsoft.com/office/2006/metadata/properties" xmlns:xsi="http://www.w3.org/2001/XMLSchema-instance" xmlns:pc="http://schemas.microsoft.com/office/infopath/2007/PartnerControls">
+  <documentManagement/>
+</p:properties>
+</file>
+
+<file path=customXml/item2.xml><?xml version="1.0" encoding="utf-8"?>
+<?mso-contentType ?>
+<FormTemplates xmlns="http://schemas.microsoft.com/sharepoint/v3/contenttype/forms">
+  <Display>DocumentLibraryForm</Display>
+  <Edit>DocumentLibraryForm</Edit>
+  <New>DocumentLibraryForm</New>
+</FormTemplates>
+</file>
+
+<file path=customXml/item3.xml><?xml version="1.0" encoding="utf-8"?>
 <ct:contentTypeSchema xmlns:ct="http://schemas.microsoft.com/office/2006/metadata/contentType" xmlns:ma="http://schemas.microsoft.com/office/2006/metadata/properties/metaAttributes" ct:_="" ma:_="" ma:contentTypeName="Document" ma:contentTypeID="0x0101001A307FBA45E73B4C8D5201D6E93AE7FF" ma:contentTypeVersion="12" ma:contentTypeDescription="Een nieuw document maken." ma:contentTypeScope="" ma:versionID="1511d4655840890b32fcad7f389df94f">
   <xsd:schema xmlns:xsd="http://www.w3.org/2001/XMLSchema" xmlns:xs="http://www.w3.org/2001/XMLSchema" xmlns:p="http://schemas.microsoft.com/office/2006/metadata/properties" xmlns:ns2="08656f9a-5533-445c-9745-8b78b9f32e94" xmlns:ns3="06e5ad5a-5b9a-49ca-a431-d1b157b50487" targetNamespace="http://schemas.microsoft.com/office/2006/metadata/properties" ma:root="true" ma:fieldsID="539f88e4fb7a1cbef328a6828929e87c" ns2:_="" ns3:_="">
     <xsd:import namespace="08656f9a-5533-445c-9745-8b78b9f32e94"/>
@@ -10515,22 +10710,32 @@
 </ct:contentTypeSchema>
 </file>
 
-<file path=customXml/item2.xml><?xml version="1.0" encoding="utf-8"?>
-<p:properties xmlns:p="http://schemas.microsoft.com/office/2006/metadata/properties" xmlns:xsi="http://www.w3.org/2001/XMLSchema-instance" xmlns:pc="http://schemas.microsoft.com/office/infopath/2007/PartnerControls">
-  <documentManagement/>
-</p:properties>
+<file path=customXml/itemProps1.xml><?xml version="1.0" encoding="utf-8"?>
+<ds:datastoreItem xmlns:ds="http://schemas.openxmlformats.org/officeDocument/2006/customXml" ds:itemID="{25C28F49-CCF8-4C08-8BEF-F21A499BF089}">
+  <ds:schemaRefs>
+    <ds:schemaRef ds:uri="http://schemas.microsoft.com/office/infopath/2007/PartnerControls"/>
+    <ds:schemaRef ds:uri="06e5ad5a-5b9a-49ca-a431-d1b157b50487"/>
+    <ds:schemaRef ds:uri="http://purl.org/dc/elements/1.1/"/>
+    <ds:schemaRef ds:uri="http://schemas.microsoft.com/office/2006/metadata/properties"/>
+    <ds:schemaRef ds:uri="http://purl.org/dc/terms/"/>
+    <ds:schemaRef ds:uri="http://schemas.microsoft.com/office/2006/documentManagement/types"/>
+    <ds:schemaRef ds:uri="http://purl.org/dc/dcmitype/"/>
+    <ds:schemaRef ds:uri="http://schemas.openxmlformats.org/package/2006/metadata/core-properties"/>
+    <ds:schemaRef ds:uri="08656f9a-5533-445c-9745-8b78b9f32e94"/>
+    <ds:schemaRef ds:uri="http://www.w3.org/XML/1998/namespace"/>
+  </ds:schemaRefs>
+</ds:datastoreItem>
 </file>
 
-<file path=customXml/item3.xml><?xml version="1.0" encoding="utf-8"?>
-<?mso-contentType ?>
-<FormTemplates xmlns="http://schemas.microsoft.com/sharepoint/v3/contenttype/forms">
-  <Display>DocumentLibraryForm</Display>
-  <Edit>DocumentLibraryForm</Edit>
-  <New>DocumentLibraryForm</New>
-</FormTemplates>
+<file path=customXml/itemProps2.xml><?xml version="1.0" encoding="utf-8"?>
+<ds:datastoreItem xmlns:ds="http://schemas.openxmlformats.org/officeDocument/2006/customXml" ds:itemID="{08DF8E97-005B-4FEF-9F58-4A2A9CB25CBC}">
+  <ds:schemaRefs>
+    <ds:schemaRef ds:uri="http://schemas.microsoft.com/sharepoint/v3/contenttype/forms"/>
+  </ds:schemaRefs>
+</ds:datastoreItem>
 </file>
 
-<file path=customXml/itemProps1.xml><?xml version="1.0" encoding="utf-8"?>
+<file path=customXml/itemProps3.xml><?xml version="1.0" encoding="utf-8"?>
 <ds:datastoreItem xmlns:ds="http://schemas.openxmlformats.org/officeDocument/2006/customXml" ds:itemID="{D13B0F8B-C6BF-424F-B8EF-4C8F63D24DFD}">
   <ds:schemaRefs>
     <ds:schemaRef ds:uri="http://schemas.microsoft.com/office/2006/metadata/contentType"/>
@@ -10547,29 +10752,4 @@
     <ds:schemaRef ds:uri="http://schemas.microsoft.com/internal/obd"/>
   </ds:schemaRefs>
 </ds:datastoreItem>
-</file>
-
-<file path=customXml/itemProps2.xml><?xml version="1.0" encoding="utf-8"?>
-<ds:datastoreItem xmlns:ds="http://schemas.openxmlformats.org/officeDocument/2006/customXml" ds:itemID="{25C28F49-CCF8-4C08-8BEF-F21A499BF089}">
-  <ds:schemaRefs>
-    <ds:schemaRef ds:uri="http://schemas.microsoft.com/office/infopath/2007/PartnerControls"/>
-    <ds:schemaRef ds:uri="06e5ad5a-5b9a-49ca-a431-d1b157b50487"/>
-    <ds:schemaRef ds:uri="http://purl.org/dc/elements/1.1/"/>
-    <ds:schemaRef ds:uri="http://schemas.microsoft.com/office/2006/metadata/properties"/>
-    <ds:schemaRef ds:uri="http://purl.org/dc/terms/"/>
-    <ds:schemaRef ds:uri="http://schemas.microsoft.com/office/2006/documentManagement/types"/>
-    <ds:schemaRef ds:uri="http://purl.org/dc/dcmitype/"/>
-    <ds:schemaRef ds:uri="http://schemas.openxmlformats.org/package/2006/metadata/core-properties"/>
-    <ds:schemaRef ds:uri="08656f9a-5533-445c-9745-8b78b9f32e94"/>
-    <ds:schemaRef ds:uri="http://www.w3.org/XML/1998/namespace"/>
-  </ds:schemaRefs>
-</ds:datastoreItem>
-</file>
-
-<file path=customXml/itemProps3.xml><?xml version="1.0" encoding="utf-8"?>
-<ds:datastoreItem xmlns:ds="http://schemas.openxmlformats.org/officeDocument/2006/customXml" ds:itemID="{08DF8E97-005B-4FEF-9F58-4A2A9CB25CBC}">
-  <ds:schemaRefs>
-    <ds:schemaRef ds:uri="http://schemas.microsoft.com/sharepoint/v3/contenttype/forms"/>
-  </ds:schemaRefs>
-</ds:datastoreItem>
 </file>
</xml_diff>